<commit_message>
IMU connected via RS232 Adapter
</commit_message>
<xml_diff>
--- a/docs/Wiring.pptx
+++ b/docs/Wiring.pptx
@@ -6,6 +6,10 @@
   </p:sldMasterIdLst>
   <p:sldIdLst>
     <p:sldId id="256" r:id="rId2"/>
+    <p:sldId id="257" r:id="rId3"/>
+    <p:sldId id="258" r:id="rId4"/>
+    <p:sldId id="259" r:id="rId5"/>
+    <p:sldId id="260" r:id="rId6"/>
   </p:sldIdLst>
   <p:sldSz cx="12192000" cy="6858000"/>
   <p:notesSz cx="6858000" cy="9144000"/>
@@ -104,6 +108,11 @@
       </a:defRPr>
     </a:lvl9pPr>
   </p:defaultTextStyle>
+  <p:extLst>
+    <p:ext uri="{EFAFB233-063F-42B5-8137-9DF3F51BA10A}">
+      <p15:sldGuideLst xmlns:p15="http://schemas.microsoft.com/office/powerpoint/2012/main"/>
+    </p:ext>
+  </p:extLst>
 </p:presentation>
 </file>
 
@@ -256,7 +265,7 @@
           <a:p>
             <a:fld id="{4031BD71-AB75-48A5-9DD3-2C8B92F7C741}" type="datetimeFigureOut">
               <a:rPr lang="de-DE" smtClean="0"/>
-              <a:t>18.04.2022</a:t>
+              <a:t>14.05.2022</a:t>
             </a:fld>
             <a:endParaRPr lang="de-DE"/>
           </a:p>
@@ -456,7 +465,7 @@
           <a:p>
             <a:fld id="{4031BD71-AB75-48A5-9DD3-2C8B92F7C741}" type="datetimeFigureOut">
               <a:rPr lang="de-DE" smtClean="0"/>
-              <a:t>18.04.2022</a:t>
+              <a:t>14.05.2022</a:t>
             </a:fld>
             <a:endParaRPr lang="de-DE"/>
           </a:p>
@@ -666,7 +675,7 @@
           <a:p>
             <a:fld id="{4031BD71-AB75-48A5-9DD3-2C8B92F7C741}" type="datetimeFigureOut">
               <a:rPr lang="de-DE" smtClean="0"/>
-              <a:t>18.04.2022</a:t>
+              <a:t>14.05.2022</a:t>
             </a:fld>
             <a:endParaRPr lang="de-DE"/>
           </a:p>
@@ -866,7 +875,7 @@
           <a:p>
             <a:fld id="{4031BD71-AB75-48A5-9DD3-2C8B92F7C741}" type="datetimeFigureOut">
               <a:rPr lang="de-DE" smtClean="0"/>
-              <a:t>18.04.2022</a:t>
+              <a:t>14.05.2022</a:t>
             </a:fld>
             <a:endParaRPr lang="de-DE"/>
           </a:p>
@@ -1142,7 +1151,7 @@
           <a:p>
             <a:fld id="{4031BD71-AB75-48A5-9DD3-2C8B92F7C741}" type="datetimeFigureOut">
               <a:rPr lang="de-DE" smtClean="0"/>
-              <a:t>18.04.2022</a:t>
+              <a:t>14.05.2022</a:t>
             </a:fld>
             <a:endParaRPr lang="de-DE"/>
           </a:p>
@@ -1410,7 +1419,7 @@
           <a:p>
             <a:fld id="{4031BD71-AB75-48A5-9DD3-2C8B92F7C741}" type="datetimeFigureOut">
               <a:rPr lang="de-DE" smtClean="0"/>
-              <a:t>18.04.2022</a:t>
+              <a:t>14.05.2022</a:t>
             </a:fld>
             <a:endParaRPr lang="de-DE"/>
           </a:p>
@@ -1825,7 +1834,7 @@
           <a:p>
             <a:fld id="{4031BD71-AB75-48A5-9DD3-2C8B92F7C741}" type="datetimeFigureOut">
               <a:rPr lang="de-DE" smtClean="0"/>
-              <a:t>18.04.2022</a:t>
+              <a:t>14.05.2022</a:t>
             </a:fld>
             <a:endParaRPr lang="de-DE"/>
           </a:p>
@@ -1967,7 +1976,7 @@
           <a:p>
             <a:fld id="{4031BD71-AB75-48A5-9DD3-2C8B92F7C741}" type="datetimeFigureOut">
               <a:rPr lang="de-DE" smtClean="0"/>
-              <a:t>18.04.2022</a:t>
+              <a:t>14.05.2022</a:t>
             </a:fld>
             <a:endParaRPr lang="de-DE"/>
           </a:p>
@@ -2080,7 +2089,7 @@
           <a:p>
             <a:fld id="{4031BD71-AB75-48A5-9DD3-2C8B92F7C741}" type="datetimeFigureOut">
               <a:rPr lang="de-DE" smtClean="0"/>
-              <a:t>18.04.2022</a:t>
+              <a:t>14.05.2022</a:t>
             </a:fld>
             <a:endParaRPr lang="de-DE"/>
           </a:p>
@@ -2393,7 +2402,7 @@
           <a:p>
             <a:fld id="{4031BD71-AB75-48A5-9DD3-2C8B92F7C741}" type="datetimeFigureOut">
               <a:rPr lang="de-DE" smtClean="0"/>
-              <a:t>18.04.2022</a:t>
+              <a:t>14.05.2022</a:t>
             </a:fld>
             <a:endParaRPr lang="de-DE"/>
           </a:p>
@@ -2682,7 +2691,7 @@
           <a:p>
             <a:fld id="{4031BD71-AB75-48A5-9DD3-2C8B92F7C741}" type="datetimeFigureOut">
               <a:rPr lang="de-DE" smtClean="0"/>
-              <a:t>18.04.2022</a:t>
+              <a:t>14.05.2022</a:t>
             </a:fld>
             <a:endParaRPr lang="de-DE"/>
           </a:p>
@@ -2925,7 +2934,7 @@
           <a:p>
             <a:fld id="{4031BD71-AB75-48A5-9DD3-2C8B92F7C741}" type="datetimeFigureOut">
               <a:rPr lang="de-DE" smtClean="0"/>
-              <a:t>18.04.2022</a:t>
+              <a:t>14.05.2022</a:t>
             </a:fld>
             <a:endParaRPr lang="de-DE"/>
           </a:p>
@@ -3783,6 +3792,1175 @@
 </p:sld>
 </file>
 
+<file path=ppt/slides/slide2.xml><?xml version="1.0" encoding="utf-8"?>
+<p:sld xmlns:a="http://schemas.openxmlformats.org/drawingml/2006/main" xmlns:r="http://schemas.openxmlformats.org/officeDocument/2006/relationships" xmlns:p="http://schemas.openxmlformats.org/presentationml/2006/main">
+  <p:cSld>
+    <p:spTree>
+      <p:nvGrpSpPr>
+        <p:cNvPr id="1" name=""/>
+        <p:cNvGrpSpPr/>
+        <p:nvPr/>
+      </p:nvGrpSpPr>
+      <p:grpSpPr>
+        <a:xfrm>
+          <a:off x="0" y="0"/>
+          <a:ext cx="0" cy="0"/>
+          <a:chOff x="0" y="0"/>
+          <a:chExt cx="0" cy="0"/>
+        </a:xfrm>
+      </p:grpSpPr>
+      <p:pic>
+        <p:nvPicPr>
+          <p:cNvPr id="5" name="Picture 4">
+            <a:extLst>
+              <a:ext uri="{FF2B5EF4-FFF2-40B4-BE49-F238E27FC236}">
+                <a16:creationId xmlns:a16="http://schemas.microsoft.com/office/drawing/2014/main" id="{DF5CB291-A866-4F76-80E1-FA13F7EB39F9}"/>
+              </a:ext>
+            </a:extLst>
+          </p:cNvPr>
+          <p:cNvPicPr>
+            <a:picLocks noChangeAspect="1"/>
+          </p:cNvPicPr>
+          <p:nvPr/>
+        </p:nvPicPr>
+        <p:blipFill rotWithShape="1">
+          <a:blip r:embed="rId2"/>
+          <a:srcRect t="38267"/>
+          <a:stretch/>
+        </p:blipFill>
+        <p:spPr>
+          <a:xfrm>
+            <a:off x="2103437" y="1282700"/>
+            <a:ext cx="7324725" cy="1470024"/>
+          </a:xfrm>
+          <a:prstGeom prst="rect">
+            <a:avLst/>
+          </a:prstGeom>
+        </p:spPr>
+      </p:pic>
+      <p:sp>
+        <p:nvSpPr>
+          <p:cNvPr id="10" name="TextBox 9">
+            <a:extLst>
+              <a:ext uri="{FF2B5EF4-FFF2-40B4-BE49-F238E27FC236}">
+                <a16:creationId xmlns:a16="http://schemas.microsoft.com/office/drawing/2014/main" id="{B6A52315-15B4-4757-8979-0D220E0570D0}"/>
+              </a:ext>
+            </a:extLst>
+          </p:cNvPr>
+          <p:cNvSpPr txBox="1"/>
+          <p:nvPr/>
+        </p:nvSpPr>
+        <p:spPr>
+          <a:xfrm>
+            <a:off x="3733800" y="3074670"/>
+            <a:ext cx="4227247" cy="3477875"/>
+          </a:xfrm>
+          <a:prstGeom prst="rect">
+            <a:avLst/>
+          </a:prstGeom>
+          <a:noFill/>
+        </p:spPr>
+        <p:txBody>
+          <a:bodyPr wrap="none" rtlCol="0">
+            <a:spAutoFit/>
+          </a:bodyPr>
+          <a:lstStyle/>
+          <a:p>
+            <a:r>
+              <a:rPr lang="en-GB" sz="2000" b="1" dirty="0"/>
+              <a:t>USB socket	DB9	Cable</a:t>
+            </a:r>
+          </a:p>
+          <a:p>
+            <a:r>
+              <a:rPr lang="en-GB" sz="2000" dirty="0"/>
+              <a:t>USB 1 =  USB </a:t>
+            </a:r>
+            <a:r>
+              <a:rPr lang="en-GB" sz="2000" dirty="0" err="1"/>
+              <a:t>Vcc</a:t>
+            </a:r>
+            <a:r>
+              <a:rPr lang="en-GB" sz="2000" dirty="0"/>
+              <a:t>  	Pin 3	red</a:t>
+            </a:r>
+          </a:p>
+          <a:p>
+            <a:r>
+              <a:rPr lang="en-GB" sz="2000" dirty="0"/>
+              <a:t>USB 2 = D- 	Pin 1	black</a:t>
+            </a:r>
+          </a:p>
+          <a:p>
+            <a:r>
+              <a:rPr lang="en-GB" sz="2000" dirty="0"/>
+              <a:t>USB 3 = D+	Pin 2	brown</a:t>
+            </a:r>
+          </a:p>
+          <a:p>
+            <a:r>
+              <a:rPr lang="en-GB" sz="2000" dirty="0"/>
+              <a:t>USB 4 = GND 	Pin 8	lilac</a:t>
+            </a:r>
+          </a:p>
+          <a:p>
+            <a:endParaRPr lang="en-GB" sz="2000" dirty="0"/>
+          </a:p>
+          <a:p>
+            <a:r>
+              <a:rPr lang="en-GB" sz="2000" dirty="0"/>
+              <a:t>UART Host</a:t>
+            </a:r>
+          </a:p>
+          <a:p>
+            <a:r>
+              <a:rPr lang="en-GB" sz="2000" dirty="0"/>
+              <a:t>GND		Pin 8 	lilac</a:t>
+            </a:r>
+          </a:p>
+          <a:p>
+            <a:r>
+              <a:rPr lang="en-GB" sz="2000" dirty="0"/>
+              <a:t>RX		Pin 5	yellow</a:t>
+            </a:r>
+          </a:p>
+          <a:p>
+            <a:r>
+              <a:rPr lang="en-GB" sz="2000" dirty="0"/>
+              <a:t>TX		Pin 4	orange</a:t>
+            </a:r>
+          </a:p>
+          <a:p>
+            <a:r>
+              <a:rPr lang="en-GB" sz="2000" dirty="0" err="1"/>
+              <a:t>Vcc</a:t>
+            </a:r>
+            <a:r>
+              <a:rPr lang="en-GB" sz="2000" dirty="0"/>
+              <a:t> 		Pin 3	red</a:t>
+            </a:r>
+          </a:p>
+        </p:txBody>
+      </p:sp>
+      <p:sp>
+        <p:nvSpPr>
+          <p:cNvPr id="4" name="Title 13">
+            <a:extLst>
+              <a:ext uri="{FF2B5EF4-FFF2-40B4-BE49-F238E27FC236}">
+                <a16:creationId xmlns:a16="http://schemas.microsoft.com/office/drawing/2014/main" id="{C95B0959-A62B-9C3C-4622-560A416ADCB8}"/>
+              </a:ext>
+            </a:extLst>
+          </p:cNvPr>
+          <p:cNvSpPr txBox="1">
+            <a:spLocks/>
+          </p:cNvSpPr>
+          <p:nvPr/>
+        </p:nvSpPr>
+        <p:spPr>
+          <a:xfrm>
+            <a:off x="838200" y="365125"/>
+            <a:ext cx="10515600" cy="1325563"/>
+          </a:xfrm>
+          <a:prstGeom prst="rect">
+            <a:avLst/>
+          </a:prstGeom>
+        </p:spPr>
+        <p:txBody>
+          <a:bodyPr vert="horz" lIns="91440" tIns="45720" rIns="91440" bIns="45720" rtlCol="0" anchor="t">
+            <a:normAutofit/>
+          </a:bodyPr>
+          <a:lstStyle>
+            <a:lvl1pPr algn="ctr" defTabSz="914400" rtl="0" eaLnBrk="1" latinLnBrk="0" hangingPunct="1">
+              <a:lnSpc>
+                <a:spcPct val="90000"/>
+              </a:lnSpc>
+              <a:spcBef>
+                <a:spcPct val="0"/>
+              </a:spcBef>
+              <a:buNone/>
+              <a:defRPr sz="6000" kern="1200">
+                <a:solidFill>
+                  <a:schemeClr val="tx1"/>
+                </a:solidFill>
+                <a:latin typeface="+mj-lt"/>
+                <a:ea typeface="+mj-ea"/>
+                <a:cs typeface="+mj-cs"/>
+              </a:defRPr>
+            </a:lvl1pPr>
+          </a:lstStyle>
+          <a:p>
+            <a:pPr algn="l"/>
+            <a:r>
+              <a:rPr lang="de-DE" sz="4000" dirty="0" err="1">
+                <a:latin typeface="Arial" panose="020B0604020202020204" pitchFamily="34" charset="0"/>
+                <a:cs typeface="Arial" panose="020B0604020202020204" pitchFamily="34" charset="0"/>
+              </a:rPr>
+              <a:t>Wiring</a:t>
+            </a:r>
+            <a:r>
+              <a:rPr lang="de-DE" sz="4000" dirty="0">
+                <a:latin typeface="Arial" panose="020B0604020202020204" pitchFamily="34" charset="0"/>
+                <a:cs typeface="Arial" panose="020B0604020202020204" pitchFamily="34" charset="0"/>
+              </a:rPr>
+              <a:t> IMU</a:t>
+            </a:r>
+          </a:p>
+        </p:txBody>
+      </p:sp>
+    </p:spTree>
+    <p:extLst>
+      <p:ext uri="{BB962C8B-B14F-4D97-AF65-F5344CB8AC3E}">
+        <p14:creationId xmlns:p14="http://schemas.microsoft.com/office/powerpoint/2010/main" val="1477744455"/>
+      </p:ext>
+    </p:extLst>
+  </p:cSld>
+  <p:clrMapOvr>
+    <a:masterClrMapping/>
+  </p:clrMapOvr>
+</p:sld>
+</file>
+
+<file path=ppt/slides/slide3.xml><?xml version="1.0" encoding="utf-8"?>
+<p:sld xmlns:a="http://schemas.openxmlformats.org/drawingml/2006/main" xmlns:r="http://schemas.openxmlformats.org/officeDocument/2006/relationships" xmlns:p="http://schemas.openxmlformats.org/presentationml/2006/main">
+  <p:cSld>
+    <p:spTree>
+      <p:nvGrpSpPr>
+        <p:cNvPr id="1" name=""/>
+        <p:cNvGrpSpPr/>
+        <p:nvPr/>
+      </p:nvGrpSpPr>
+      <p:grpSpPr>
+        <a:xfrm>
+          <a:off x="0" y="0"/>
+          <a:ext cx="0" cy="0"/>
+          <a:chOff x="0" y="0"/>
+          <a:chExt cx="0" cy="0"/>
+        </a:xfrm>
+      </p:grpSpPr>
+      <p:pic>
+        <p:nvPicPr>
+          <p:cNvPr id="4" name="Picture 3">
+            <a:extLst>
+              <a:ext uri="{FF2B5EF4-FFF2-40B4-BE49-F238E27FC236}">
+                <a16:creationId xmlns:a16="http://schemas.microsoft.com/office/drawing/2014/main" id="{375DACB3-E492-4E41-94AF-A7F5C8C3C4D9}"/>
+              </a:ext>
+            </a:extLst>
+          </p:cNvPr>
+          <p:cNvPicPr>
+            <a:picLocks noChangeAspect="1"/>
+          </p:cNvPicPr>
+          <p:nvPr/>
+        </p:nvPicPr>
+        <p:blipFill rotWithShape="1">
+          <a:blip r:embed="rId2"/>
+          <a:srcRect t="60635"/>
+          <a:stretch/>
+        </p:blipFill>
+        <p:spPr>
+          <a:xfrm>
+            <a:off x="254000" y="745160"/>
+            <a:ext cx="7975600" cy="2051638"/>
+          </a:xfrm>
+          <a:prstGeom prst="rect">
+            <a:avLst/>
+          </a:prstGeom>
+        </p:spPr>
+      </p:pic>
+      <p:pic>
+        <p:nvPicPr>
+          <p:cNvPr id="6" name="Picture 5">
+            <a:extLst>
+              <a:ext uri="{FF2B5EF4-FFF2-40B4-BE49-F238E27FC236}">
+                <a16:creationId xmlns:a16="http://schemas.microsoft.com/office/drawing/2014/main" id="{B21D6039-1ECF-4CA5-BDA2-8DD051FBCC39}"/>
+              </a:ext>
+            </a:extLst>
+          </p:cNvPr>
+          <p:cNvPicPr>
+            <a:picLocks noChangeAspect="1"/>
+          </p:cNvPicPr>
+          <p:nvPr/>
+        </p:nvPicPr>
+        <p:blipFill>
+          <a:blip r:embed="rId3"/>
+          <a:stretch>
+            <a:fillRect/>
+          </a:stretch>
+        </p:blipFill>
+        <p:spPr>
+          <a:xfrm>
+            <a:off x="254001" y="3125630"/>
+            <a:ext cx="7975599" cy="2630169"/>
+          </a:xfrm>
+          <a:prstGeom prst="rect">
+            <a:avLst/>
+          </a:prstGeom>
+        </p:spPr>
+      </p:pic>
+      <p:pic>
+        <p:nvPicPr>
+          <p:cNvPr id="7" name="Picture 6">
+            <a:extLst>
+              <a:ext uri="{FF2B5EF4-FFF2-40B4-BE49-F238E27FC236}">
+                <a16:creationId xmlns:a16="http://schemas.microsoft.com/office/drawing/2014/main" id="{8B56F398-4B15-48E1-B18A-70AB6A2C77DB}"/>
+              </a:ext>
+            </a:extLst>
+          </p:cNvPr>
+          <p:cNvPicPr>
+            <a:picLocks noChangeAspect="1"/>
+          </p:cNvPicPr>
+          <p:nvPr/>
+        </p:nvPicPr>
+        <p:blipFill rotWithShape="1">
+          <a:blip r:embed="rId2"/>
+          <a:srcRect l="24389" r="24646" b="44067"/>
+          <a:stretch/>
+        </p:blipFill>
+        <p:spPr>
+          <a:xfrm>
+            <a:off x="8355119" y="859460"/>
+            <a:ext cx="3582880" cy="2569540"/>
+          </a:xfrm>
+          <a:prstGeom prst="rect">
+            <a:avLst/>
+          </a:prstGeom>
+        </p:spPr>
+      </p:pic>
+      <p:sp>
+        <p:nvSpPr>
+          <p:cNvPr id="8" name="Oval 7">
+            <a:extLst>
+              <a:ext uri="{FF2B5EF4-FFF2-40B4-BE49-F238E27FC236}">
+                <a16:creationId xmlns:a16="http://schemas.microsoft.com/office/drawing/2014/main" id="{C8391CC8-97E0-49D0-A746-7CC94AF385FB}"/>
+              </a:ext>
+            </a:extLst>
+          </p:cNvPr>
+          <p:cNvSpPr/>
+          <p:nvPr/>
+        </p:nvSpPr>
+        <p:spPr>
+          <a:xfrm>
+            <a:off x="10939463" y="1864043"/>
+            <a:ext cx="45720" cy="68580"/>
+          </a:xfrm>
+          <a:prstGeom prst="ellipse">
+            <a:avLst/>
+          </a:prstGeom>
+        </p:spPr>
+        <p:style>
+          <a:lnRef idx="2">
+            <a:schemeClr val="accent1">
+              <a:shade val="50000"/>
+            </a:schemeClr>
+          </a:lnRef>
+          <a:fillRef idx="1">
+            <a:schemeClr val="accent1"/>
+          </a:fillRef>
+          <a:effectRef idx="0">
+            <a:schemeClr val="accent1"/>
+          </a:effectRef>
+          <a:fontRef idx="minor">
+            <a:schemeClr val="lt1"/>
+          </a:fontRef>
+        </p:style>
+        <p:txBody>
+          <a:bodyPr rtlCol="0" anchor="ctr"/>
+          <a:lstStyle/>
+          <a:p>
+            <a:pPr algn="ctr"/>
+            <a:endParaRPr lang="en-GB"/>
+          </a:p>
+        </p:txBody>
+      </p:sp>
+      <p:sp>
+        <p:nvSpPr>
+          <p:cNvPr id="9" name="Oval 8">
+            <a:extLst>
+              <a:ext uri="{FF2B5EF4-FFF2-40B4-BE49-F238E27FC236}">
+                <a16:creationId xmlns:a16="http://schemas.microsoft.com/office/drawing/2014/main" id="{06E12556-C856-4F95-9AE6-5187517BA0FA}"/>
+              </a:ext>
+            </a:extLst>
+          </p:cNvPr>
+          <p:cNvSpPr/>
+          <p:nvPr/>
+        </p:nvSpPr>
+        <p:spPr>
+          <a:xfrm>
+            <a:off x="10739438" y="2109940"/>
+            <a:ext cx="45720" cy="68580"/>
+          </a:xfrm>
+          <a:prstGeom prst="ellipse">
+            <a:avLst/>
+          </a:prstGeom>
+        </p:spPr>
+        <p:style>
+          <a:lnRef idx="2">
+            <a:schemeClr val="accent1">
+              <a:shade val="50000"/>
+            </a:schemeClr>
+          </a:lnRef>
+          <a:fillRef idx="1">
+            <a:schemeClr val="accent1"/>
+          </a:fillRef>
+          <a:effectRef idx="0">
+            <a:schemeClr val="accent1"/>
+          </a:effectRef>
+          <a:fontRef idx="minor">
+            <a:schemeClr val="lt1"/>
+          </a:fontRef>
+        </p:style>
+        <p:txBody>
+          <a:bodyPr rtlCol="0" anchor="ctr"/>
+          <a:lstStyle/>
+          <a:p>
+            <a:pPr algn="ctr"/>
+            <a:endParaRPr lang="en-GB"/>
+          </a:p>
+        </p:txBody>
+      </p:sp>
+      <p:cxnSp>
+        <p:nvCxnSpPr>
+          <p:cNvPr id="11" name="Straight Connector 10">
+            <a:extLst>
+              <a:ext uri="{FF2B5EF4-FFF2-40B4-BE49-F238E27FC236}">
+                <a16:creationId xmlns:a16="http://schemas.microsoft.com/office/drawing/2014/main" id="{2BAC4CAD-37CC-4B9A-A7FD-549DE39AA37B}"/>
+              </a:ext>
+            </a:extLst>
+          </p:cNvPr>
+          <p:cNvCxnSpPr>
+            <a:cxnSpLocks/>
+            <a:stCxn id="9" idx="5"/>
+            <a:endCxn id="13" idx="0"/>
+          </p:cNvCxnSpPr>
+          <p:nvPr/>
+        </p:nvCxnSpPr>
+        <p:spPr>
+          <a:xfrm flipH="1">
+            <a:off x="10744273" y="2168477"/>
+            <a:ext cx="34189" cy="660428"/>
+          </a:xfrm>
+          <a:prstGeom prst="line">
+            <a:avLst/>
+          </a:prstGeom>
+          <a:ln>
+            <a:solidFill>
+              <a:schemeClr val="bg1"/>
+            </a:solidFill>
+          </a:ln>
+        </p:spPr>
+        <p:style>
+          <a:lnRef idx="1">
+            <a:schemeClr val="accent1"/>
+          </a:lnRef>
+          <a:fillRef idx="0">
+            <a:schemeClr val="accent1"/>
+          </a:fillRef>
+          <a:effectRef idx="0">
+            <a:schemeClr val="accent1"/>
+          </a:effectRef>
+          <a:fontRef idx="minor">
+            <a:schemeClr val="tx1"/>
+          </a:fontRef>
+        </p:style>
+      </p:cxnSp>
+      <p:sp>
+        <p:nvSpPr>
+          <p:cNvPr id="13" name="TextBox 12">
+            <a:extLst>
+              <a:ext uri="{FF2B5EF4-FFF2-40B4-BE49-F238E27FC236}">
+                <a16:creationId xmlns:a16="http://schemas.microsoft.com/office/drawing/2014/main" id="{8E1C9574-4448-44B0-9A3B-32B422AAC377}"/>
+              </a:ext>
+            </a:extLst>
+          </p:cNvPr>
+          <p:cNvSpPr txBox="1"/>
+          <p:nvPr/>
+        </p:nvSpPr>
+        <p:spPr>
+          <a:xfrm>
+            <a:off x="10543737" y="2828905"/>
+            <a:ext cx="401072" cy="230832"/>
+          </a:xfrm>
+          <a:prstGeom prst="rect">
+            <a:avLst/>
+          </a:prstGeom>
+          <a:noFill/>
+        </p:spPr>
+        <p:txBody>
+          <a:bodyPr wrap="none" rtlCol="0">
+            <a:spAutoFit/>
+          </a:bodyPr>
+          <a:lstStyle/>
+          <a:p>
+            <a:r>
+              <a:rPr lang="en-GB" sz="900" dirty="0">
+                <a:solidFill>
+                  <a:schemeClr val="bg1"/>
+                </a:solidFill>
+              </a:rPr>
+              <a:t>GND</a:t>
+            </a:r>
+          </a:p>
+        </p:txBody>
+      </p:sp>
+      <p:cxnSp>
+        <p:nvCxnSpPr>
+          <p:cNvPr id="14" name="Straight Connector 13">
+            <a:extLst>
+              <a:ext uri="{FF2B5EF4-FFF2-40B4-BE49-F238E27FC236}">
+                <a16:creationId xmlns:a16="http://schemas.microsoft.com/office/drawing/2014/main" id="{83F6E0E3-1FD2-4799-ACD4-7C401616CBCC}"/>
+              </a:ext>
+            </a:extLst>
+          </p:cNvPr>
+          <p:cNvCxnSpPr>
+            <a:cxnSpLocks/>
+          </p:cNvCxnSpPr>
+          <p:nvPr/>
+        </p:nvCxnSpPr>
+        <p:spPr>
+          <a:xfrm flipH="1">
+            <a:off x="10958554" y="1302214"/>
+            <a:ext cx="361909" cy="592590"/>
+          </a:xfrm>
+          <a:prstGeom prst="line">
+            <a:avLst/>
+          </a:prstGeom>
+          <a:ln>
+            <a:solidFill>
+              <a:schemeClr val="bg1"/>
+            </a:solidFill>
+          </a:ln>
+        </p:spPr>
+        <p:style>
+          <a:lnRef idx="1">
+            <a:schemeClr val="accent1"/>
+          </a:lnRef>
+          <a:fillRef idx="0">
+            <a:schemeClr val="accent1"/>
+          </a:fillRef>
+          <a:effectRef idx="0">
+            <a:schemeClr val="accent1"/>
+          </a:effectRef>
+          <a:fontRef idx="minor">
+            <a:schemeClr val="tx1"/>
+          </a:fontRef>
+        </p:style>
+      </p:cxnSp>
+      <p:sp>
+        <p:nvSpPr>
+          <p:cNvPr id="16" name="TextBox 15">
+            <a:extLst>
+              <a:ext uri="{FF2B5EF4-FFF2-40B4-BE49-F238E27FC236}">
+                <a16:creationId xmlns:a16="http://schemas.microsoft.com/office/drawing/2014/main" id="{AEE3BDD4-6D36-4447-A767-6632D1CCA9C0}"/>
+              </a:ext>
+            </a:extLst>
+          </p:cNvPr>
+          <p:cNvSpPr txBox="1"/>
+          <p:nvPr/>
+        </p:nvSpPr>
+        <p:spPr>
+          <a:xfrm>
+            <a:off x="11159174" y="1222260"/>
+            <a:ext cx="290464" cy="230832"/>
+          </a:xfrm>
+          <a:prstGeom prst="rect">
+            <a:avLst/>
+          </a:prstGeom>
+          <a:noFill/>
+        </p:spPr>
+        <p:txBody>
+          <a:bodyPr wrap="none" rtlCol="0">
+            <a:spAutoFit/>
+          </a:bodyPr>
+          <a:lstStyle/>
+          <a:p>
+            <a:r>
+              <a:rPr lang="en-GB" sz="900" dirty="0">
+                <a:solidFill>
+                  <a:schemeClr val="bg1"/>
+                </a:solidFill>
+              </a:rPr>
+              <a:t>D-</a:t>
+            </a:r>
+          </a:p>
+        </p:txBody>
+      </p:sp>
+      <p:sp>
+        <p:nvSpPr>
+          <p:cNvPr id="17" name="TextBox 16">
+            <a:extLst>
+              <a:ext uri="{FF2B5EF4-FFF2-40B4-BE49-F238E27FC236}">
+                <a16:creationId xmlns:a16="http://schemas.microsoft.com/office/drawing/2014/main" id="{63A4DAC9-E9CA-48F6-850C-6BEB9E112C02}"/>
+              </a:ext>
+            </a:extLst>
+          </p:cNvPr>
+          <p:cNvSpPr txBox="1"/>
+          <p:nvPr/>
+        </p:nvSpPr>
+        <p:spPr>
+          <a:xfrm>
+            <a:off x="10982552" y="1252961"/>
+            <a:ext cx="312906" cy="230832"/>
+          </a:xfrm>
+          <a:prstGeom prst="rect">
+            <a:avLst/>
+          </a:prstGeom>
+          <a:noFill/>
+        </p:spPr>
+        <p:txBody>
+          <a:bodyPr wrap="none" rtlCol="0">
+            <a:spAutoFit/>
+          </a:bodyPr>
+          <a:lstStyle/>
+          <a:p>
+            <a:r>
+              <a:rPr lang="en-GB" sz="900" dirty="0">
+                <a:solidFill>
+                  <a:schemeClr val="bg1"/>
+                </a:solidFill>
+              </a:rPr>
+              <a:t>D+</a:t>
+            </a:r>
+          </a:p>
+        </p:txBody>
+      </p:sp>
+      <p:cxnSp>
+        <p:nvCxnSpPr>
+          <p:cNvPr id="18" name="Straight Connector 17">
+            <a:extLst>
+              <a:ext uri="{FF2B5EF4-FFF2-40B4-BE49-F238E27FC236}">
+                <a16:creationId xmlns:a16="http://schemas.microsoft.com/office/drawing/2014/main" id="{1087AFB8-BA94-406C-87E1-3FDC9081C203}"/>
+              </a:ext>
+            </a:extLst>
+          </p:cNvPr>
+          <p:cNvCxnSpPr>
+            <a:cxnSpLocks/>
+          </p:cNvCxnSpPr>
+          <p:nvPr/>
+        </p:nvCxnSpPr>
+        <p:spPr>
+          <a:xfrm flipH="1">
+            <a:off x="10868568" y="1379811"/>
+            <a:ext cx="203688" cy="548764"/>
+          </a:xfrm>
+          <a:prstGeom prst="line">
+            <a:avLst/>
+          </a:prstGeom>
+          <a:ln>
+            <a:solidFill>
+              <a:schemeClr val="bg1"/>
+            </a:solidFill>
+          </a:ln>
+        </p:spPr>
+        <p:style>
+          <a:lnRef idx="1">
+            <a:schemeClr val="accent1"/>
+          </a:lnRef>
+          <a:fillRef idx="0">
+            <a:schemeClr val="accent1"/>
+          </a:fillRef>
+          <a:effectRef idx="0">
+            <a:schemeClr val="accent1"/>
+          </a:effectRef>
+          <a:fontRef idx="minor">
+            <a:schemeClr val="tx1"/>
+          </a:fontRef>
+        </p:style>
+      </p:cxnSp>
+      <p:cxnSp>
+        <p:nvCxnSpPr>
+          <p:cNvPr id="19" name="Straight Connector 18">
+            <a:extLst>
+              <a:ext uri="{FF2B5EF4-FFF2-40B4-BE49-F238E27FC236}">
+                <a16:creationId xmlns:a16="http://schemas.microsoft.com/office/drawing/2014/main" id="{016669A6-6628-454B-99CA-5F6F4FB8CEFA}"/>
+              </a:ext>
+            </a:extLst>
+          </p:cNvPr>
+          <p:cNvCxnSpPr>
+            <a:cxnSpLocks/>
+          </p:cNvCxnSpPr>
+          <p:nvPr/>
+        </p:nvCxnSpPr>
+        <p:spPr>
+          <a:xfrm flipH="1">
+            <a:off x="10792018" y="1234518"/>
+            <a:ext cx="154305" cy="762815"/>
+          </a:xfrm>
+          <a:prstGeom prst="line">
+            <a:avLst/>
+          </a:prstGeom>
+          <a:ln>
+            <a:solidFill>
+              <a:schemeClr val="bg1"/>
+            </a:solidFill>
+          </a:ln>
+        </p:spPr>
+        <p:style>
+          <a:lnRef idx="1">
+            <a:schemeClr val="accent1"/>
+          </a:lnRef>
+          <a:fillRef idx="0">
+            <a:schemeClr val="accent1"/>
+          </a:fillRef>
+          <a:effectRef idx="0">
+            <a:schemeClr val="accent1"/>
+          </a:effectRef>
+          <a:fontRef idx="minor">
+            <a:schemeClr val="tx1"/>
+          </a:fontRef>
+        </p:style>
+      </p:cxnSp>
+      <p:sp>
+        <p:nvSpPr>
+          <p:cNvPr id="20" name="TextBox 19">
+            <a:extLst>
+              <a:ext uri="{FF2B5EF4-FFF2-40B4-BE49-F238E27FC236}">
+                <a16:creationId xmlns:a16="http://schemas.microsoft.com/office/drawing/2014/main" id="{7C902951-6CB7-499B-8147-FD6173ACDACE}"/>
+              </a:ext>
+            </a:extLst>
+          </p:cNvPr>
+          <p:cNvSpPr txBox="1"/>
+          <p:nvPr/>
+        </p:nvSpPr>
+        <p:spPr>
+          <a:xfrm>
+            <a:off x="10627997" y="1088733"/>
+            <a:ext cx="574196" cy="230832"/>
+          </a:xfrm>
+          <a:prstGeom prst="rect">
+            <a:avLst/>
+          </a:prstGeom>
+          <a:noFill/>
+        </p:spPr>
+        <p:txBody>
+          <a:bodyPr wrap="none" rtlCol="0">
+            <a:spAutoFit/>
+          </a:bodyPr>
+          <a:lstStyle/>
+          <a:p>
+            <a:r>
+              <a:rPr lang="en-GB" sz="900" dirty="0">
+                <a:solidFill>
+                  <a:schemeClr val="bg1"/>
+                </a:solidFill>
+              </a:rPr>
+              <a:t>3.2-5.2V</a:t>
+            </a:r>
+          </a:p>
+        </p:txBody>
+      </p:sp>
+      <p:cxnSp>
+        <p:nvCxnSpPr>
+          <p:cNvPr id="26" name="Straight Connector 25">
+            <a:extLst>
+              <a:ext uri="{FF2B5EF4-FFF2-40B4-BE49-F238E27FC236}">
+                <a16:creationId xmlns:a16="http://schemas.microsoft.com/office/drawing/2014/main" id="{1C663F40-372B-4B44-8438-F47E3910B725}"/>
+              </a:ext>
+            </a:extLst>
+          </p:cNvPr>
+          <p:cNvCxnSpPr>
+            <a:cxnSpLocks/>
+          </p:cNvCxnSpPr>
+          <p:nvPr/>
+        </p:nvCxnSpPr>
+        <p:spPr>
+          <a:xfrm flipH="1">
+            <a:off x="10709542" y="1459555"/>
+            <a:ext cx="17070" cy="556221"/>
+          </a:xfrm>
+          <a:prstGeom prst="line">
+            <a:avLst/>
+          </a:prstGeom>
+          <a:ln>
+            <a:solidFill>
+              <a:schemeClr val="bg1"/>
+            </a:solidFill>
+          </a:ln>
+        </p:spPr>
+        <p:style>
+          <a:lnRef idx="1">
+            <a:schemeClr val="accent1"/>
+          </a:lnRef>
+          <a:fillRef idx="0">
+            <a:schemeClr val="accent1"/>
+          </a:fillRef>
+          <a:effectRef idx="0">
+            <a:schemeClr val="accent1"/>
+          </a:effectRef>
+          <a:fontRef idx="minor">
+            <a:schemeClr val="tx1"/>
+          </a:fontRef>
+        </p:style>
+      </p:cxnSp>
+      <p:sp>
+        <p:nvSpPr>
+          <p:cNvPr id="28" name="TextBox 27">
+            <a:extLst>
+              <a:ext uri="{FF2B5EF4-FFF2-40B4-BE49-F238E27FC236}">
+                <a16:creationId xmlns:a16="http://schemas.microsoft.com/office/drawing/2014/main" id="{AA807858-6460-4030-9E9C-58F5F666D43D}"/>
+              </a:ext>
+            </a:extLst>
+          </p:cNvPr>
+          <p:cNvSpPr txBox="1"/>
+          <p:nvPr/>
+        </p:nvSpPr>
+        <p:spPr>
+          <a:xfrm>
+            <a:off x="10564349" y="1262686"/>
+            <a:ext cx="306494" cy="230832"/>
+          </a:xfrm>
+          <a:prstGeom prst="rect">
+            <a:avLst/>
+          </a:prstGeom>
+          <a:noFill/>
+        </p:spPr>
+        <p:txBody>
+          <a:bodyPr wrap="none" rtlCol="0">
+            <a:spAutoFit/>
+          </a:bodyPr>
+          <a:lstStyle/>
+          <a:p>
+            <a:r>
+              <a:rPr lang="en-GB" sz="900" dirty="0">
+                <a:solidFill>
+                  <a:schemeClr val="bg1"/>
+                </a:solidFill>
+              </a:rPr>
+              <a:t>RX</a:t>
+            </a:r>
+          </a:p>
+        </p:txBody>
+      </p:sp>
+      <p:sp>
+        <p:nvSpPr>
+          <p:cNvPr id="29" name="TextBox 28">
+            <a:extLst>
+              <a:ext uri="{FF2B5EF4-FFF2-40B4-BE49-F238E27FC236}">
+                <a16:creationId xmlns:a16="http://schemas.microsoft.com/office/drawing/2014/main" id="{24F2DBFA-69B2-4EE4-A791-4BEA083F6D34}"/>
+              </a:ext>
+            </a:extLst>
+          </p:cNvPr>
+          <p:cNvSpPr txBox="1"/>
+          <p:nvPr/>
+        </p:nvSpPr>
+        <p:spPr>
+          <a:xfrm>
+            <a:off x="10372632" y="1388780"/>
+            <a:ext cx="306494" cy="230832"/>
+          </a:xfrm>
+          <a:prstGeom prst="rect">
+            <a:avLst/>
+          </a:prstGeom>
+          <a:noFill/>
+        </p:spPr>
+        <p:txBody>
+          <a:bodyPr wrap="none" rtlCol="0">
+            <a:spAutoFit/>
+          </a:bodyPr>
+          <a:lstStyle/>
+          <a:p>
+            <a:r>
+              <a:rPr lang="en-GB" sz="900" dirty="0">
+                <a:solidFill>
+                  <a:schemeClr val="bg1"/>
+                </a:solidFill>
+              </a:rPr>
+              <a:t>TX</a:t>
+            </a:r>
+          </a:p>
+        </p:txBody>
+      </p:sp>
+      <p:cxnSp>
+        <p:nvCxnSpPr>
+          <p:cNvPr id="30" name="Straight Connector 29">
+            <a:extLst>
+              <a:ext uri="{FF2B5EF4-FFF2-40B4-BE49-F238E27FC236}">
+                <a16:creationId xmlns:a16="http://schemas.microsoft.com/office/drawing/2014/main" id="{B950EF90-9E85-48A9-86E7-6B407A990A38}"/>
+              </a:ext>
+            </a:extLst>
+          </p:cNvPr>
+          <p:cNvCxnSpPr>
+            <a:cxnSpLocks/>
+          </p:cNvCxnSpPr>
+          <p:nvPr/>
+        </p:nvCxnSpPr>
+        <p:spPr>
+          <a:xfrm>
+            <a:off x="10606088" y="1566863"/>
+            <a:ext cx="39278" cy="489007"/>
+          </a:xfrm>
+          <a:prstGeom prst="line">
+            <a:avLst/>
+          </a:prstGeom>
+          <a:ln>
+            <a:solidFill>
+              <a:schemeClr val="bg1"/>
+            </a:solidFill>
+          </a:ln>
+        </p:spPr>
+        <p:style>
+          <a:lnRef idx="1">
+            <a:schemeClr val="accent1"/>
+          </a:lnRef>
+          <a:fillRef idx="0">
+            <a:schemeClr val="accent1"/>
+          </a:fillRef>
+          <a:effectRef idx="0">
+            <a:schemeClr val="accent1"/>
+          </a:effectRef>
+          <a:fontRef idx="minor">
+            <a:schemeClr val="tx1"/>
+          </a:fontRef>
+        </p:style>
+      </p:cxnSp>
+    </p:spTree>
+    <p:extLst>
+      <p:ext uri="{BB962C8B-B14F-4D97-AF65-F5344CB8AC3E}">
+        <p14:creationId xmlns:p14="http://schemas.microsoft.com/office/powerpoint/2010/main" val="3633548844"/>
+      </p:ext>
+    </p:extLst>
+  </p:cSld>
+  <p:clrMapOvr>
+    <a:masterClrMapping/>
+  </p:clrMapOvr>
+</p:sld>
+</file>
+
+<file path=ppt/slides/slide4.xml><?xml version="1.0" encoding="utf-8"?>
+<p:sld xmlns:a="http://schemas.openxmlformats.org/drawingml/2006/main" xmlns:r="http://schemas.openxmlformats.org/officeDocument/2006/relationships" xmlns:p="http://schemas.openxmlformats.org/presentationml/2006/main">
+  <p:cSld>
+    <p:spTree>
+      <p:nvGrpSpPr>
+        <p:cNvPr id="1" name=""/>
+        <p:cNvGrpSpPr/>
+        <p:nvPr/>
+      </p:nvGrpSpPr>
+      <p:grpSpPr>
+        <a:xfrm>
+          <a:off x="0" y="0"/>
+          <a:ext cx="0" cy="0"/>
+          <a:chOff x="0" y="0"/>
+          <a:chExt cx="0" cy="0"/>
+        </a:xfrm>
+      </p:grpSpPr>
+      <p:sp>
+        <p:nvSpPr>
+          <p:cNvPr id="4" name="TextBox 3">
+            <a:extLst>
+              <a:ext uri="{FF2B5EF4-FFF2-40B4-BE49-F238E27FC236}">
+                <a16:creationId xmlns:a16="http://schemas.microsoft.com/office/drawing/2014/main" id="{BF82022A-390F-4D63-A130-F2E405312E46}"/>
+              </a:ext>
+            </a:extLst>
+          </p:cNvPr>
+          <p:cNvSpPr txBox="1"/>
+          <p:nvPr/>
+        </p:nvSpPr>
+        <p:spPr>
+          <a:xfrm>
+            <a:off x="1074420" y="617220"/>
+            <a:ext cx="9241889" cy="646331"/>
+          </a:xfrm>
+          <a:prstGeom prst="rect">
+            <a:avLst/>
+          </a:prstGeom>
+          <a:noFill/>
+        </p:spPr>
+        <p:txBody>
+          <a:bodyPr wrap="none" rtlCol="0">
+            <a:spAutoFit/>
+          </a:bodyPr>
+          <a:lstStyle/>
+          <a:p>
+            <a:r>
+              <a:rPr lang="en-GB" b="1" dirty="0"/>
+              <a:t>Documentation</a:t>
+            </a:r>
+          </a:p>
+          <a:p>
+            <a:r>
+              <a:rPr lang="en-GB" dirty="0"/>
+              <a:t>https://www.microstrain.com/inertial/3dm-gx3-25?qt-product_quicktab=2#qt-product_quicktab</a:t>
+            </a:r>
+          </a:p>
+        </p:txBody>
+      </p:sp>
+    </p:spTree>
+    <p:extLst>
+      <p:ext uri="{BB962C8B-B14F-4D97-AF65-F5344CB8AC3E}">
+        <p14:creationId xmlns:p14="http://schemas.microsoft.com/office/powerpoint/2010/main" val="3895351555"/>
+      </p:ext>
+    </p:extLst>
+  </p:cSld>
+  <p:clrMapOvr>
+    <a:masterClrMapping/>
+  </p:clrMapOvr>
+</p:sld>
+</file>
+
+<file path=ppt/slides/slide5.xml><?xml version="1.0" encoding="utf-8"?>
+<p:sld xmlns:a="http://schemas.openxmlformats.org/drawingml/2006/main" xmlns:r="http://schemas.openxmlformats.org/officeDocument/2006/relationships" xmlns:p="http://schemas.openxmlformats.org/presentationml/2006/main">
+  <p:cSld>
+    <p:spTree>
+      <p:nvGrpSpPr>
+        <p:cNvPr id="1" name=""/>
+        <p:cNvGrpSpPr/>
+        <p:nvPr/>
+      </p:nvGrpSpPr>
+      <p:grpSpPr>
+        <a:xfrm>
+          <a:off x="0" y="0"/>
+          <a:ext cx="0" cy="0"/>
+          <a:chOff x="0" y="0"/>
+          <a:chExt cx="0" cy="0"/>
+        </a:xfrm>
+      </p:grpSpPr>
+      <p:pic>
+        <p:nvPicPr>
+          <p:cNvPr id="5" name="Picture 4">
+            <a:extLst>
+              <a:ext uri="{FF2B5EF4-FFF2-40B4-BE49-F238E27FC236}">
+                <a16:creationId xmlns:a16="http://schemas.microsoft.com/office/drawing/2014/main" id="{132E3298-518B-A173-EFCB-FCA257BB717B}"/>
+              </a:ext>
+            </a:extLst>
+          </p:cNvPr>
+          <p:cNvPicPr>
+            <a:picLocks noChangeAspect="1"/>
+          </p:cNvPicPr>
+          <p:nvPr/>
+        </p:nvPicPr>
+        <p:blipFill rotWithShape="1">
+          <a:blip r:embed="rId2"/>
+          <a:srcRect l="42500" t="67917" r="36615" b="8535"/>
+          <a:stretch/>
+        </p:blipFill>
+        <p:spPr>
+          <a:xfrm>
+            <a:off x="2876826" y="698500"/>
+            <a:ext cx="6864074" cy="3149600"/>
+          </a:xfrm>
+          <a:prstGeom prst="rect">
+            <a:avLst/>
+          </a:prstGeom>
+        </p:spPr>
+      </p:pic>
+      <p:pic>
+        <p:nvPicPr>
+          <p:cNvPr id="7" name="Picture 6">
+            <a:extLst>
+              <a:ext uri="{FF2B5EF4-FFF2-40B4-BE49-F238E27FC236}">
+                <a16:creationId xmlns:a16="http://schemas.microsoft.com/office/drawing/2014/main" id="{FCDA1A4C-110B-D215-66A0-97BBFB31D266}"/>
+              </a:ext>
+            </a:extLst>
+          </p:cNvPr>
+          <p:cNvPicPr>
+            <a:picLocks noChangeAspect="1"/>
+          </p:cNvPicPr>
+          <p:nvPr/>
+        </p:nvPicPr>
+        <p:blipFill>
+          <a:blip r:embed="rId3">
+            <a:extLst>
+              <a:ext uri="{28A0092B-C50C-407E-A947-70E740481C1C}">
+                <a14:useLocalDpi xmlns:a14="http://schemas.microsoft.com/office/drawing/2010/main" val="0"/>
+              </a:ext>
+            </a:extLst>
+          </a:blip>
+          <a:stretch>
+            <a:fillRect/>
+          </a:stretch>
+        </p:blipFill>
+        <p:spPr>
+          <a:xfrm>
+            <a:off x="1238250" y="4586940"/>
+            <a:ext cx="2889250" cy="1699559"/>
+          </a:xfrm>
+          <a:prstGeom prst="rect">
+            <a:avLst/>
+          </a:prstGeom>
+        </p:spPr>
+      </p:pic>
+      <p:sp>
+        <p:nvSpPr>
+          <p:cNvPr id="9" name="TextBox 8">
+            <a:extLst>
+              <a:ext uri="{FF2B5EF4-FFF2-40B4-BE49-F238E27FC236}">
+                <a16:creationId xmlns:a16="http://schemas.microsoft.com/office/drawing/2014/main" id="{2A3F16F7-D93A-A1FC-E65C-BCCEEB341156}"/>
+              </a:ext>
+            </a:extLst>
+          </p:cNvPr>
+          <p:cNvSpPr txBox="1"/>
+          <p:nvPr/>
+        </p:nvSpPr>
+        <p:spPr>
+          <a:xfrm>
+            <a:off x="3048000" y="3244334"/>
+            <a:ext cx="6096000" cy="369332"/>
+          </a:xfrm>
+          <a:prstGeom prst="rect">
+            <a:avLst/>
+          </a:prstGeom>
+          <a:noFill/>
+        </p:spPr>
+        <p:txBody>
+          <a:bodyPr wrap="square">
+            <a:spAutoFit/>
+          </a:bodyPr>
+          <a:lstStyle/>
+          <a:p>
+            <a:r>
+              <a:rPr lang="en-GB" dirty="0"/>
+              <a:t>http://picprojects.org.uk/projects/simpleSIO/ssio.htm</a:t>
+            </a:r>
+          </a:p>
+        </p:txBody>
+      </p:sp>
+      <p:pic>
+        <p:nvPicPr>
+          <p:cNvPr id="11" name="Picture 10">
+            <a:extLst>
+              <a:ext uri="{FF2B5EF4-FFF2-40B4-BE49-F238E27FC236}">
+                <a16:creationId xmlns:a16="http://schemas.microsoft.com/office/drawing/2014/main" id="{E93EC588-780F-D068-A707-49A36E286275}"/>
+              </a:ext>
+            </a:extLst>
+          </p:cNvPr>
+          <p:cNvPicPr>
+            <a:picLocks noChangeAspect="1"/>
+          </p:cNvPicPr>
+          <p:nvPr/>
+        </p:nvPicPr>
+        <p:blipFill>
+          <a:blip r:embed="rId4">
+            <a:extLst>
+              <a:ext uri="{28A0092B-C50C-407E-A947-70E740481C1C}">
+                <a14:useLocalDpi xmlns:a14="http://schemas.microsoft.com/office/drawing/2010/main" val="0"/>
+              </a:ext>
+            </a:extLst>
+          </a:blip>
+          <a:stretch>
+            <a:fillRect/>
+          </a:stretch>
+        </p:blipFill>
+        <p:spPr>
+          <a:xfrm>
+            <a:off x="6602412" y="3632716"/>
+            <a:ext cx="4105275" cy="3190875"/>
+          </a:xfrm>
+          <a:prstGeom prst="rect">
+            <a:avLst/>
+          </a:prstGeom>
+        </p:spPr>
+      </p:pic>
+    </p:spTree>
+    <p:extLst>
+      <p:ext uri="{BB962C8B-B14F-4D97-AF65-F5344CB8AC3E}">
+        <p14:creationId xmlns:p14="http://schemas.microsoft.com/office/powerpoint/2010/main" val="306050767"/>
+      </p:ext>
+    </p:extLst>
+  </p:cSld>
+  <p:clrMapOvr>
+    <a:masterClrMapping/>
+  </p:clrMapOvr>
+</p:sld>
+</file>
+
 <file path=ppt/theme/theme1.xml><?xml version="1.0" encoding="utf-8"?>
 <a:theme xmlns:a="http://schemas.openxmlformats.org/drawingml/2006/main" name="Office Theme">
   <a:themeElements>

</xml_diff>

<commit_message>
used MAX3232 IC for IMU connection now
</commit_message>
<xml_diff>
--- a/docs/Wiring.pptx
+++ b/docs/Wiring.pptx
@@ -8,7 +8,7 @@
     <p:sldId id="256" r:id="rId2"/>
     <p:sldId id="257" r:id="rId3"/>
     <p:sldId id="258" r:id="rId4"/>
-    <p:sldId id="259" r:id="rId5"/>
+    <p:sldId id="261" r:id="rId5"/>
     <p:sldId id="260" r:id="rId6"/>
   </p:sldIdLst>
   <p:sldSz cx="12192000" cy="6858000"/>
@@ -3853,7 +3853,7 @@
         <p:spPr>
           <a:xfrm>
             <a:off x="3733800" y="3074670"/>
-            <a:ext cx="4227247" cy="3477875"/>
+            <a:ext cx="4169731" cy="2123658"/>
           </a:xfrm>
           <a:prstGeom prst="rect">
             <a:avLst/>
@@ -3867,77 +3867,77 @@
           <a:lstStyle/>
           <a:p>
             <a:r>
-              <a:rPr lang="en-GB" sz="2000" b="1" dirty="0"/>
+              <a:rPr lang="en-GB" sz="1200" b="1" dirty="0"/>
               <a:t>USB socket	DB9	Cable</a:t>
             </a:r>
           </a:p>
           <a:p>
             <a:r>
-              <a:rPr lang="en-GB" sz="2000" dirty="0"/>
+              <a:rPr lang="en-GB" sz="1200" dirty="0"/>
               <a:t>USB 1 =  USB </a:t>
             </a:r>
             <a:r>
-              <a:rPr lang="en-GB" sz="2000" dirty="0" err="1"/>
+              <a:rPr lang="en-GB" sz="1200" dirty="0" err="1"/>
               <a:t>Vcc</a:t>
             </a:r>
             <a:r>
-              <a:rPr lang="en-GB" sz="2000" dirty="0"/>
+              <a:rPr lang="en-GB" sz="1200" dirty="0"/>
               <a:t>  	Pin 3	red</a:t>
             </a:r>
           </a:p>
           <a:p>
             <a:r>
-              <a:rPr lang="en-GB" sz="2000" dirty="0"/>
+              <a:rPr lang="en-GB" sz="1200" dirty="0"/>
               <a:t>USB 2 = D- 	Pin 1	black</a:t>
             </a:r>
           </a:p>
           <a:p>
             <a:r>
-              <a:rPr lang="en-GB" sz="2000" dirty="0"/>
+              <a:rPr lang="en-GB" sz="1200" dirty="0"/>
               <a:t>USB 3 = D+	Pin 2	brown</a:t>
             </a:r>
           </a:p>
           <a:p>
             <a:r>
-              <a:rPr lang="en-GB" sz="2000" dirty="0"/>
+              <a:rPr lang="en-GB" sz="1200" dirty="0"/>
               <a:t>USB 4 = GND 	Pin 8	lilac</a:t>
             </a:r>
           </a:p>
           <a:p>
-            <a:endParaRPr lang="en-GB" sz="2000" dirty="0"/>
-          </a:p>
-          <a:p>
-            <a:r>
-              <a:rPr lang="en-GB" sz="2000" dirty="0"/>
-              <a:t>UART Host</a:t>
-            </a:r>
-          </a:p>
-          <a:p>
-            <a:r>
-              <a:rPr lang="en-GB" sz="2000" dirty="0"/>
-              <a:t>GND		Pin 8 	lilac</a:t>
-            </a:r>
-          </a:p>
-          <a:p>
-            <a:r>
-              <a:rPr lang="en-GB" sz="2000" dirty="0"/>
-              <a:t>RX		Pin 5	yellow</a:t>
-            </a:r>
-          </a:p>
-          <a:p>
-            <a:r>
-              <a:rPr lang="en-GB" sz="2000" dirty="0"/>
-              <a:t>TX		Pin 4	orange</a:t>
-            </a:r>
-          </a:p>
-          <a:p>
-            <a:r>
-              <a:rPr lang="en-GB" sz="2000" dirty="0" err="1"/>
+            <a:endParaRPr lang="en-GB" sz="1200" dirty="0"/>
+          </a:p>
+          <a:p>
+            <a:r>
+              <a:rPr lang="en-GB" sz="1200" dirty="0"/>
+              <a:t>UART Host			IMU</a:t>
+            </a:r>
+          </a:p>
+          <a:p>
+            <a:r>
+              <a:rPr lang="en-GB" sz="1200" dirty="0"/>
+              <a:t>GND		Pin 8 	lilac	GND</a:t>
+            </a:r>
+          </a:p>
+          <a:p>
+            <a:r>
+              <a:rPr lang="en-GB" sz="1200" dirty="0"/>
+              <a:t>RX		Pin 5	yellow	TX</a:t>
+            </a:r>
+          </a:p>
+          <a:p>
+            <a:r>
+              <a:rPr lang="en-GB" sz="1200" dirty="0"/>
+              <a:t>TX		Pin 4	orange	RX</a:t>
+            </a:r>
+          </a:p>
+          <a:p>
+            <a:r>
+              <a:rPr lang="en-GB" sz="1200" dirty="0" err="1"/>
               <a:t>Vcc</a:t>
             </a:r>
             <a:r>
-              <a:rPr lang="en-GB" sz="2000" dirty="0"/>
-              <a:t> 		Pin 3	red</a:t>
+              <a:rPr lang="en-GB" sz="1200" dirty="0"/>
+              <a:t> 		Pin 3	red	VCC</a:t>
             </a:r>
           </a:p>
         </p:txBody>
@@ -4058,8 +4058,8 @@
         </p:blipFill>
         <p:spPr>
           <a:xfrm>
-            <a:off x="254000" y="745160"/>
-            <a:ext cx="7975600" cy="2051638"/>
+            <a:off x="247650" y="1516746"/>
+            <a:ext cx="7154653" cy="1840458"/>
           </a:xfrm>
           <a:prstGeom prst="rect">
             <a:avLst/>
@@ -4088,8 +4088,8 @@
         </p:blipFill>
         <p:spPr>
           <a:xfrm>
-            <a:off x="254001" y="3125630"/>
-            <a:ext cx="7975599" cy="2630169"/>
+            <a:off x="247651" y="3872026"/>
+            <a:ext cx="7054849" cy="2326527"/>
           </a:xfrm>
           <a:prstGeom prst="rect">
             <a:avLst/>
@@ -4117,7 +4117,7 @@
         </p:blipFill>
         <p:spPr>
           <a:xfrm>
-            <a:off x="8355119" y="859460"/>
+            <a:off x="8348769" y="1302214"/>
             <a:ext cx="3582880" cy="2569540"/>
           </a:xfrm>
           <a:prstGeom prst="rect">
@@ -4711,6 +4711,151 @@
           </a:fontRef>
         </p:style>
       </p:cxnSp>
+      <p:sp>
+        <p:nvSpPr>
+          <p:cNvPr id="21" name="TextBox 20">
+            <a:extLst>
+              <a:ext uri="{FF2B5EF4-FFF2-40B4-BE49-F238E27FC236}">
+                <a16:creationId xmlns:a16="http://schemas.microsoft.com/office/drawing/2014/main" id="{B0F57F3E-5DBD-F68A-C7B5-B538CFB35A64}"/>
+              </a:ext>
+            </a:extLst>
+          </p:cNvPr>
+          <p:cNvSpPr txBox="1"/>
+          <p:nvPr/>
+        </p:nvSpPr>
+        <p:spPr>
+          <a:xfrm>
+            <a:off x="153670" y="98829"/>
+            <a:ext cx="9241889" cy="646331"/>
+          </a:xfrm>
+          <a:prstGeom prst="rect">
+            <a:avLst/>
+          </a:prstGeom>
+          <a:noFill/>
+        </p:spPr>
+        <p:txBody>
+          <a:bodyPr wrap="none" rtlCol="0">
+            <a:spAutoFit/>
+          </a:bodyPr>
+          <a:lstStyle/>
+          <a:p>
+            <a:r>
+              <a:rPr lang="en-GB" b="1" dirty="0"/>
+              <a:t>Documentation</a:t>
+            </a:r>
+          </a:p>
+          <a:p>
+            <a:r>
+              <a:rPr lang="en-GB" dirty="0"/>
+              <a:t>https://www.microstrain.com/inertial/3dm-gx3-25?qt-product_quicktab=2#qt-product_quicktab</a:t>
+            </a:r>
+          </a:p>
+        </p:txBody>
+      </p:sp>
+      <p:sp>
+        <p:nvSpPr>
+          <p:cNvPr id="22" name="TextBox 21">
+            <a:extLst>
+              <a:ext uri="{FF2B5EF4-FFF2-40B4-BE49-F238E27FC236}">
+                <a16:creationId xmlns:a16="http://schemas.microsoft.com/office/drawing/2014/main" id="{48553E5E-1054-E914-1D07-869E00A0F4CC}"/>
+              </a:ext>
+            </a:extLst>
+          </p:cNvPr>
+          <p:cNvSpPr txBox="1"/>
+          <p:nvPr/>
+        </p:nvSpPr>
+        <p:spPr>
+          <a:xfrm>
+            <a:off x="7639050" y="4145312"/>
+            <a:ext cx="4169731" cy="2123658"/>
+          </a:xfrm>
+          <a:prstGeom prst="rect">
+            <a:avLst/>
+          </a:prstGeom>
+          <a:noFill/>
+        </p:spPr>
+        <p:txBody>
+          <a:bodyPr wrap="none" rtlCol="0">
+            <a:spAutoFit/>
+          </a:bodyPr>
+          <a:lstStyle/>
+          <a:p>
+            <a:r>
+              <a:rPr lang="en-GB" sz="1200" b="1" dirty="0"/>
+              <a:t>USB socket	DB9	Cable</a:t>
+            </a:r>
+          </a:p>
+          <a:p>
+            <a:r>
+              <a:rPr lang="en-GB" sz="1200" dirty="0"/>
+              <a:t>USB 1 =  USB </a:t>
+            </a:r>
+            <a:r>
+              <a:rPr lang="en-GB" sz="1200" dirty="0" err="1"/>
+              <a:t>Vcc</a:t>
+            </a:r>
+            <a:r>
+              <a:rPr lang="en-GB" sz="1200" dirty="0"/>
+              <a:t>  	Pin 3	red</a:t>
+            </a:r>
+          </a:p>
+          <a:p>
+            <a:r>
+              <a:rPr lang="en-GB" sz="1200" dirty="0"/>
+              <a:t>USB 2 = D- 	Pin 1	black</a:t>
+            </a:r>
+          </a:p>
+          <a:p>
+            <a:r>
+              <a:rPr lang="en-GB" sz="1200" dirty="0"/>
+              <a:t>USB 3 = D+	Pin 2	brown</a:t>
+            </a:r>
+          </a:p>
+          <a:p>
+            <a:r>
+              <a:rPr lang="en-GB" sz="1200" dirty="0"/>
+              <a:t>USB 4 = GND 	Pin 8	lilac</a:t>
+            </a:r>
+          </a:p>
+          <a:p>
+            <a:endParaRPr lang="en-GB" sz="1200" dirty="0"/>
+          </a:p>
+          <a:p>
+            <a:r>
+              <a:rPr lang="en-GB" sz="1200" b="1" dirty="0"/>
+              <a:t>UART Host			IMU</a:t>
+            </a:r>
+          </a:p>
+          <a:p>
+            <a:r>
+              <a:rPr lang="en-GB" sz="1200" dirty="0"/>
+              <a:t>GND		Pin 8 	lilac	GND</a:t>
+            </a:r>
+          </a:p>
+          <a:p>
+            <a:r>
+              <a:rPr lang="en-GB" sz="1200" dirty="0"/>
+              <a:t>RX		Pin 5	yellow	TX</a:t>
+            </a:r>
+          </a:p>
+          <a:p>
+            <a:r>
+              <a:rPr lang="en-GB" sz="1200" dirty="0"/>
+              <a:t>TX		Pin 4	orange	RX</a:t>
+            </a:r>
+          </a:p>
+          <a:p>
+            <a:r>
+              <a:rPr lang="en-GB" sz="1200" dirty="0" err="1"/>
+              <a:t>Vcc</a:t>
+            </a:r>
+            <a:r>
+              <a:rPr lang="en-GB" sz="1200" dirty="0"/>
+              <a:t> 		Pin 3	red	VCC</a:t>
+            </a:r>
+          </a:p>
+        </p:txBody>
+      </p:sp>
     </p:spTree>
     <p:extLst>
       <p:ext uri="{BB962C8B-B14F-4D97-AF65-F5344CB8AC3E}">
@@ -4741,12 +4886,42 @@
           <a:chExt cx="0" cy="0"/>
         </a:xfrm>
       </p:grpSpPr>
-      <p:sp>
-        <p:nvSpPr>
-          <p:cNvPr id="4" name="TextBox 3">
-            <a:extLst>
-              <a:ext uri="{FF2B5EF4-FFF2-40B4-BE49-F238E27FC236}">
-                <a16:creationId xmlns:a16="http://schemas.microsoft.com/office/drawing/2014/main" id="{BF82022A-390F-4D63-A130-F2E405312E46}"/>
+      <p:pic>
+        <p:nvPicPr>
+          <p:cNvPr id="5" name="Picture 4">
+            <a:extLst>
+              <a:ext uri="{FF2B5EF4-FFF2-40B4-BE49-F238E27FC236}">
+                <a16:creationId xmlns:a16="http://schemas.microsoft.com/office/drawing/2014/main" id="{B98BBA12-506A-E051-41E2-6D7AA4774815}"/>
+              </a:ext>
+            </a:extLst>
+          </p:cNvPr>
+          <p:cNvPicPr>
+            <a:picLocks noChangeAspect="1"/>
+          </p:cNvPicPr>
+          <p:nvPr/>
+        </p:nvPicPr>
+        <p:blipFill>
+          <a:blip r:embed="rId2"/>
+          <a:stretch>
+            <a:fillRect/>
+          </a:stretch>
+        </p:blipFill>
+        <p:spPr>
+          <a:xfrm>
+            <a:off x="552450" y="694912"/>
+            <a:ext cx="7833747" cy="5845587"/>
+          </a:xfrm>
+          <a:prstGeom prst="rect">
+            <a:avLst/>
+          </a:prstGeom>
+        </p:spPr>
+      </p:pic>
+      <p:sp>
+        <p:nvSpPr>
+          <p:cNvPr id="7" name="TextBox 6">
+            <a:extLst>
+              <a:ext uri="{FF2B5EF4-FFF2-40B4-BE49-F238E27FC236}">
+                <a16:creationId xmlns:a16="http://schemas.microsoft.com/office/drawing/2014/main" id="{19DBF0BC-8E1C-73E2-5C97-B63774742FF7}"/>
               </a:ext>
             </a:extLst>
           </p:cNvPr>
@@ -4755,8 +4930,8 @@
         </p:nvSpPr>
         <p:spPr>
           <a:xfrm>
-            <a:off x="1074420" y="617220"/>
-            <a:ext cx="9241889" cy="646331"/>
+            <a:off x="1047750" y="189985"/>
+            <a:ext cx="6096000" cy="369332"/>
           </a:xfrm>
           <a:prstGeom prst="rect">
             <a:avLst/>
@@ -4764,28 +4939,122 @@
           <a:noFill/>
         </p:spPr>
         <p:txBody>
-          <a:bodyPr wrap="none" rtlCol="0">
+          <a:bodyPr wrap="square">
             <a:spAutoFit/>
           </a:bodyPr>
           <a:lstStyle/>
           <a:p>
             <a:r>
-              <a:rPr lang="en-GB" b="1" dirty="0"/>
-              <a:t>Documentation</a:t>
-            </a:r>
-          </a:p>
-          <a:p>
-            <a:r>
               <a:rPr lang="en-GB" dirty="0"/>
-              <a:t>https://www.microstrain.com/inertial/3dm-gx3-25?qt-product_quicktab=2#qt-product_quicktab</a:t>
-            </a:r>
-          </a:p>
-        </p:txBody>
-      </p:sp>
+              <a:t>https://www.sparkfun.com/products/11189</a:t>
+            </a:r>
+          </a:p>
+        </p:txBody>
+      </p:sp>
+      <p:pic>
+        <p:nvPicPr>
+          <p:cNvPr id="9" name="Picture 8">
+            <a:extLst>
+              <a:ext uri="{FF2B5EF4-FFF2-40B4-BE49-F238E27FC236}">
+                <a16:creationId xmlns:a16="http://schemas.microsoft.com/office/drawing/2014/main" id="{E4E02942-5CC7-4DE0-634D-7DE30F3673B8}"/>
+              </a:ext>
+            </a:extLst>
+          </p:cNvPr>
+          <p:cNvPicPr>
+            <a:picLocks noChangeAspect="1"/>
+          </p:cNvPicPr>
+          <p:nvPr/>
+        </p:nvPicPr>
+        <p:blipFill rotWithShape="1">
+          <a:blip r:embed="rId3">
+            <a:extLst>
+              <a:ext uri="{28A0092B-C50C-407E-A947-70E740481C1C}">
+                <a14:useLocalDpi xmlns:a14="http://schemas.microsoft.com/office/drawing/2010/main" val="0"/>
+              </a:ext>
+            </a:extLst>
+          </a:blip>
+          <a:srcRect l="19445" r="21181"/>
+          <a:stretch/>
+        </p:blipFill>
+        <p:spPr>
+          <a:xfrm>
+            <a:off x="10090150" y="4660900"/>
+            <a:ext cx="1085850" cy="1828800"/>
+          </a:xfrm>
+          <a:prstGeom prst="rect">
+            <a:avLst/>
+          </a:prstGeom>
+        </p:spPr>
+      </p:pic>
+      <p:pic>
+        <p:nvPicPr>
+          <p:cNvPr id="11" name="Picture 10">
+            <a:extLst>
+              <a:ext uri="{FF2B5EF4-FFF2-40B4-BE49-F238E27FC236}">
+                <a16:creationId xmlns:a16="http://schemas.microsoft.com/office/drawing/2014/main" id="{60137D7C-3054-FC96-F91C-0CF53385E4B0}"/>
+              </a:ext>
+            </a:extLst>
+          </p:cNvPr>
+          <p:cNvPicPr>
+            <a:picLocks noChangeAspect="1"/>
+          </p:cNvPicPr>
+          <p:nvPr/>
+        </p:nvPicPr>
+        <p:blipFill rotWithShape="1">
+          <a:blip r:embed="rId4">
+            <a:extLst>
+              <a:ext uri="{28A0092B-C50C-407E-A947-70E740481C1C}">
+                <a14:useLocalDpi xmlns:a14="http://schemas.microsoft.com/office/drawing/2010/main" val="0"/>
+              </a:ext>
+            </a:extLst>
+          </a:blip>
+          <a:srcRect l="19098" r="16319"/>
+          <a:stretch/>
+        </p:blipFill>
+        <p:spPr>
+          <a:xfrm>
+            <a:off x="8655050" y="4660900"/>
+            <a:ext cx="1181100" cy="1828800"/>
+          </a:xfrm>
+          <a:prstGeom prst="rect">
+            <a:avLst/>
+          </a:prstGeom>
+        </p:spPr>
+      </p:pic>
+      <p:pic>
+        <p:nvPicPr>
+          <p:cNvPr id="13" name="Picture 12">
+            <a:extLst>
+              <a:ext uri="{FF2B5EF4-FFF2-40B4-BE49-F238E27FC236}">
+                <a16:creationId xmlns:a16="http://schemas.microsoft.com/office/drawing/2014/main" id="{B0333F8A-56C6-8E51-8B81-A1B0DAB7DF38}"/>
+              </a:ext>
+            </a:extLst>
+          </p:cNvPr>
+          <p:cNvPicPr>
+            <a:picLocks noChangeAspect="1"/>
+          </p:cNvPicPr>
+          <p:nvPr/>
+        </p:nvPicPr>
+        <p:blipFill>
+          <a:blip r:embed="rId5"/>
+          <a:stretch>
+            <a:fillRect/>
+          </a:stretch>
+        </p:blipFill>
+        <p:spPr>
+          <a:xfrm>
+            <a:off x="6939819" y="767835"/>
+            <a:ext cx="4807681" cy="3200400"/>
+          </a:xfrm>
+          <a:prstGeom prst="rect">
+            <a:avLst/>
+          </a:prstGeom>
+        </p:spPr>
+      </p:pic>
     </p:spTree>
     <p:extLst>
       <p:ext uri="{BB962C8B-B14F-4D97-AF65-F5344CB8AC3E}">
-        <p14:creationId xmlns:p14="http://schemas.microsoft.com/office/powerpoint/2010/main" val="3895351555"/>
+        <p14:creationId xmlns:p14="http://schemas.microsoft.com/office/powerpoint/2010/main" val="1000844284"/>
       </p:ext>
     </p:extLst>
   </p:cSld>
@@ -4814,10 +5083,10 @@
       </p:grpSpPr>
       <p:pic>
         <p:nvPicPr>
-          <p:cNvPr id="5" name="Picture 4">
-            <a:extLst>
-              <a:ext uri="{FF2B5EF4-FFF2-40B4-BE49-F238E27FC236}">
-                <a16:creationId xmlns:a16="http://schemas.microsoft.com/office/drawing/2014/main" id="{132E3298-518B-A173-EFCB-FCA257BB717B}"/>
+          <p:cNvPr id="7" name="Picture 6">
+            <a:extLst>
+              <a:ext uri="{FF2B5EF4-FFF2-40B4-BE49-F238E27FC236}">
+                <a16:creationId xmlns:a16="http://schemas.microsoft.com/office/drawing/2014/main" id="{FCDA1A4C-110B-D215-66A0-97BBFB31D266}"/>
               </a:ext>
             </a:extLst>
           </p:cNvPr>
@@ -4826,27 +5095,69 @@
           </p:cNvPicPr>
           <p:nvPr/>
         </p:nvPicPr>
-        <p:blipFill rotWithShape="1">
-          <a:blip r:embed="rId2"/>
-          <a:srcRect l="42500" t="67917" r="36615" b="8535"/>
-          <a:stretch/>
+        <p:blipFill>
+          <a:blip r:embed="rId2">
+            <a:extLst>
+              <a:ext uri="{28A0092B-C50C-407E-A947-70E740481C1C}">
+                <a14:useLocalDpi xmlns:a14="http://schemas.microsoft.com/office/drawing/2010/main" val="0"/>
+              </a:ext>
+            </a:extLst>
+          </a:blip>
+          <a:stretch>
+            <a:fillRect/>
+          </a:stretch>
         </p:blipFill>
         <p:spPr>
           <a:xfrm>
-            <a:off x="2876826" y="698500"/>
-            <a:ext cx="6864074" cy="3149600"/>
+            <a:off x="1238250" y="4586940"/>
+            <a:ext cx="2889250" cy="1699559"/>
           </a:xfrm>
           <a:prstGeom prst="rect">
             <a:avLst/>
           </a:prstGeom>
         </p:spPr>
       </p:pic>
+      <p:sp>
+        <p:nvSpPr>
+          <p:cNvPr id="9" name="TextBox 8">
+            <a:extLst>
+              <a:ext uri="{FF2B5EF4-FFF2-40B4-BE49-F238E27FC236}">
+                <a16:creationId xmlns:a16="http://schemas.microsoft.com/office/drawing/2014/main" id="{2A3F16F7-D93A-A1FC-E65C-BCCEEB341156}"/>
+              </a:ext>
+            </a:extLst>
+          </p:cNvPr>
+          <p:cNvSpPr txBox="1"/>
+          <p:nvPr/>
+        </p:nvSpPr>
+        <p:spPr>
+          <a:xfrm>
+            <a:off x="3048000" y="3244334"/>
+            <a:ext cx="6096000" cy="369332"/>
+          </a:xfrm>
+          <a:prstGeom prst="rect">
+            <a:avLst/>
+          </a:prstGeom>
+          <a:noFill/>
+        </p:spPr>
+        <p:txBody>
+          <a:bodyPr wrap="square">
+            <a:spAutoFit/>
+          </a:bodyPr>
+          <a:lstStyle/>
+          <a:p>
+            <a:r>
+              <a:rPr lang="en-GB" dirty="0"/>
+              <a:t>http://picprojects.org.uk/projects/simpleSIO/ssio.htm</a:t>
+            </a:r>
+          </a:p>
+        </p:txBody>
+      </p:sp>
       <p:pic>
         <p:nvPicPr>
-          <p:cNvPr id="7" name="Picture 6">
-            <a:extLst>
-              <a:ext uri="{FF2B5EF4-FFF2-40B4-BE49-F238E27FC236}">
-                <a16:creationId xmlns:a16="http://schemas.microsoft.com/office/drawing/2014/main" id="{FCDA1A4C-110B-D215-66A0-97BBFB31D266}"/>
+          <p:cNvPr id="11" name="Picture 10">
+            <a:extLst>
+              <a:ext uri="{FF2B5EF4-FFF2-40B4-BE49-F238E27FC236}">
+                <a16:creationId xmlns:a16="http://schemas.microsoft.com/office/drawing/2014/main" id="{E93EC588-780F-D068-A707-49A36E286275}"/>
               </a:ext>
             </a:extLst>
           </p:cNvPr>
@@ -4869,55 +5180,20 @@
         </p:blipFill>
         <p:spPr>
           <a:xfrm>
-            <a:off x="1238250" y="4586940"/>
-            <a:ext cx="2889250" cy="1699559"/>
+            <a:off x="6602412" y="3632716"/>
+            <a:ext cx="4105275" cy="3190875"/>
           </a:xfrm>
           <a:prstGeom prst="rect">
             <a:avLst/>
           </a:prstGeom>
         </p:spPr>
       </p:pic>
-      <p:sp>
-        <p:nvSpPr>
-          <p:cNvPr id="9" name="TextBox 8">
-            <a:extLst>
-              <a:ext uri="{FF2B5EF4-FFF2-40B4-BE49-F238E27FC236}">
-                <a16:creationId xmlns:a16="http://schemas.microsoft.com/office/drawing/2014/main" id="{2A3F16F7-D93A-A1FC-E65C-BCCEEB341156}"/>
-              </a:ext>
-            </a:extLst>
-          </p:cNvPr>
-          <p:cNvSpPr txBox="1"/>
-          <p:nvPr/>
-        </p:nvSpPr>
-        <p:spPr>
-          <a:xfrm>
-            <a:off x="3048000" y="3244334"/>
-            <a:ext cx="6096000" cy="369332"/>
-          </a:xfrm>
-          <a:prstGeom prst="rect">
-            <a:avLst/>
-          </a:prstGeom>
-          <a:noFill/>
-        </p:spPr>
-        <p:txBody>
-          <a:bodyPr wrap="square">
-            <a:spAutoFit/>
-          </a:bodyPr>
-          <a:lstStyle/>
-          <a:p>
-            <a:r>
-              <a:rPr lang="en-GB" dirty="0"/>
-              <a:t>http://picprojects.org.uk/projects/simpleSIO/ssio.htm</a:t>
-            </a:r>
-          </a:p>
-        </p:txBody>
-      </p:sp>
       <p:pic>
         <p:nvPicPr>
-          <p:cNvPr id="11" name="Picture 10">
-            <a:extLst>
-              <a:ext uri="{FF2B5EF4-FFF2-40B4-BE49-F238E27FC236}">
-                <a16:creationId xmlns:a16="http://schemas.microsoft.com/office/drawing/2014/main" id="{E93EC588-780F-D068-A707-49A36E286275}"/>
+          <p:cNvPr id="13" name="Picture 12">
+            <a:extLst>
+              <a:ext uri="{FF2B5EF4-FFF2-40B4-BE49-F238E27FC236}">
+                <a16:creationId xmlns:a16="http://schemas.microsoft.com/office/drawing/2014/main" id="{D7D2A97F-5B5F-7AC0-762C-3C6B3201374F}"/>
               </a:ext>
             </a:extLst>
           </p:cNvPr>
@@ -4940,8 +5216,44 @@
         </p:blipFill>
         <p:spPr>
           <a:xfrm>
-            <a:off x="6602412" y="3632716"/>
-            <a:ext cx="4105275" cy="3190875"/>
+            <a:off x="3550021" y="570941"/>
+            <a:ext cx="2545979" cy="1682750"/>
+          </a:xfrm>
+          <a:prstGeom prst="rect">
+            <a:avLst/>
+          </a:prstGeom>
+        </p:spPr>
+      </p:pic>
+      <p:pic>
+        <p:nvPicPr>
+          <p:cNvPr id="15" name="Picture 14">
+            <a:extLst>
+              <a:ext uri="{FF2B5EF4-FFF2-40B4-BE49-F238E27FC236}">
+                <a16:creationId xmlns:a16="http://schemas.microsoft.com/office/drawing/2014/main" id="{101F7FEA-7074-0748-57C4-6C9713180057}"/>
+              </a:ext>
+            </a:extLst>
+          </p:cNvPr>
+          <p:cNvPicPr>
+            <a:picLocks noChangeAspect="1"/>
+          </p:cNvPicPr>
+          <p:nvPr/>
+        </p:nvPicPr>
+        <p:blipFill>
+          <a:blip r:embed="rId5">
+            <a:extLst>
+              <a:ext uri="{28A0092B-C50C-407E-A947-70E740481C1C}">
+                <a14:useLocalDpi xmlns:a14="http://schemas.microsoft.com/office/drawing/2010/main" val="0"/>
+              </a:ext>
+            </a:extLst>
+          </a:blip>
+          <a:stretch>
+            <a:fillRect/>
+          </a:stretch>
+        </p:blipFill>
+        <p:spPr>
+          <a:xfrm>
+            <a:off x="439457" y="478472"/>
+            <a:ext cx="2243418" cy="1906905"/>
           </a:xfrm>
           <a:prstGeom prst="rect">
             <a:avLst/>

</xml_diff>